<commit_message>
added repo link to ppt and created pdf slide deck
</commit_message>
<xml_diff>
--- a/introduction_to_stratoshark.pptx
+++ b/introduction_to_stratoshark.pptx
@@ -128,6 +128,58 @@
 </p:presentation>
 </file>
 
+<file path=ppt/revisionInfo.xml><?xml version="1.0" encoding="utf-8"?>
+<p1510:revInfo xmlns:a="http://schemas.openxmlformats.org/drawingml/2006/main" xmlns:r="http://schemas.openxmlformats.org/officeDocument/2006/relationships" xmlns:p1510="http://schemas.microsoft.com/office/powerpoint/2015/10/main">
+  <p1510:revLst>
+    <p1510:client id="{44EDFAF7-825D-1A43-9502-8E05F1BA453D}" v="1" dt="2025-06-11T22:29:30.673"/>
+  </p1510:revLst>
+</p1510:revInfo>
+</file>
+
+<file path=ppt/changesInfos/changesInfo1.xml><?xml version="1.0" encoding="utf-8"?>
+<pc:chgInfo xmlns:a="http://schemas.openxmlformats.org/drawingml/2006/main" xmlns:r="http://schemas.openxmlformats.org/officeDocument/2006/relationships" xmlns:ac="http://schemas.microsoft.com/office/drawing/2013/main/command" xmlns:pc="http://schemas.microsoft.com/office/powerpoint/2013/main/command">
+  <pc:docChgLst>
+    <pc:chgData name="Josh Clark" userId="038a1c1f14b3b0b8" providerId="LiveId" clId="{44EDFAF7-825D-1A43-9502-8E05F1BA453D}"/>
+    <pc:docChg chg="modSld">
+      <pc:chgData name="Josh Clark" userId="038a1c1f14b3b0b8" providerId="LiveId" clId="{44EDFAF7-825D-1A43-9502-8E05F1BA453D}" dt="2025-06-11T22:29:52.365" v="8" actId="1076"/>
+      <pc:docMkLst>
+        <pc:docMk/>
+      </pc:docMkLst>
+      <pc:sldChg chg="modSp mod">
+        <pc:chgData name="Josh Clark" userId="038a1c1f14b3b0b8" providerId="LiveId" clId="{44EDFAF7-825D-1A43-9502-8E05F1BA453D}" dt="2025-06-11T22:29:26.809" v="2"/>
+        <pc:sldMkLst>
+          <pc:docMk/>
+          <pc:sldMk cId="810563073" sldId="256"/>
+        </pc:sldMkLst>
+        <pc:spChg chg="mod">
+          <ac:chgData name="Josh Clark" userId="038a1c1f14b3b0b8" providerId="LiveId" clId="{44EDFAF7-825D-1A43-9502-8E05F1BA453D}" dt="2025-06-11T22:29:26.809" v="2"/>
+          <ac:spMkLst>
+            <pc:docMk/>
+            <pc:sldMk cId="810563073" sldId="256"/>
+            <ac:spMk id="3" creationId="{016A2CF3-6252-F1B9-B0B3-2A38FBD1E993}"/>
+          </ac:spMkLst>
+        </pc:spChg>
+      </pc:sldChg>
+      <pc:sldChg chg="addSp modSp mod">
+        <pc:chgData name="Josh Clark" userId="038a1c1f14b3b0b8" providerId="LiveId" clId="{44EDFAF7-825D-1A43-9502-8E05F1BA453D}" dt="2025-06-11T22:29:52.365" v="8" actId="1076"/>
+        <pc:sldMkLst>
+          <pc:docMk/>
+          <pc:sldMk cId="1269254422" sldId="257"/>
+        </pc:sldMkLst>
+        <pc:spChg chg="add mod">
+          <ac:chgData name="Josh Clark" userId="038a1c1f14b3b0b8" providerId="LiveId" clId="{44EDFAF7-825D-1A43-9502-8E05F1BA453D}" dt="2025-06-11T22:29:52.365" v="8" actId="1076"/>
+          <ac:spMkLst>
+            <pc:docMk/>
+            <pc:sldMk cId="1269254422" sldId="257"/>
+            <ac:spMk id="5" creationId="{B4F0116E-DA4C-CC96-9281-AB3FABAE8965}"/>
+          </ac:spMkLst>
+        </pc:spChg>
+      </pc:sldChg>
+    </pc:docChg>
+  </pc:docChgLst>
+</pc:chgInfo>
+</file>
+
 <file path=ppt/notesMasters/notesMaster1.xml><?xml version="1.0" encoding="utf-8"?>
 <p:notesMaster xmlns:a="http://schemas.openxmlformats.org/drawingml/2006/main" xmlns:r="http://schemas.openxmlformats.org/officeDocument/2006/relationships" xmlns:p="http://schemas.openxmlformats.org/presentationml/2006/main">
   <p:cSld>
@@ -210,7 +262,7 @@
           <a:p>
             <a:fld id="{B233D847-AEF7-FF4D-BD54-B99CE00D0E3D}" type="datetimeFigureOut">
               <a:rPr lang="en-US" smtClean="0"/>
-              <a:t>6/10/25</a:t>
+              <a:t>6/11/25</a:t>
             </a:fld>
             <a:endParaRPr lang="en-US"/>
           </a:p>
@@ -636,7 +688,7 @@
           <a:p>
             <a:fld id="{8761A448-C7F2-2847-B192-565C3C193606}" type="datetime1">
               <a:rPr lang="en-US" smtClean="0"/>
-              <a:t>6/10/25</a:t>
+              <a:t>6/11/25</a:t>
             </a:fld>
             <a:endParaRPr lang="en-US"/>
           </a:p>
@@ -856,7 +908,7 @@
           <a:p>
             <a:fld id="{70A94BB3-4C16-A343-9829-EA8D581D2BDF}" type="datetime1">
               <a:rPr lang="en-US" smtClean="0"/>
-              <a:t>6/10/25</a:t>
+              <a:t>6/11/25</a:t>
             </a:fld>
             <a:endParaRPr lang="en-US"/>
           </a:p>
@@ -1086,7 +1138,7 @@
           <a:p>
             <a:fld id="{7A54D3DB-F878-0246-9072-5A89BDA2F6C6}" type="datetime1">
               <a:rPr lang="en-US" smtClean="0"/>
-              <a:t>6/10/25</a:t>
+              <a:t>6/11/25</a:t>
             </a:fld>
             <a:endParaRPr lang="en-US"/>
           </a:p>
@@ -1314,7 +1366,7 @@
           <a:p>
             <a:fld id="{3565266E-2D18-0E4E-A27B-1F32704C3B3B}" type="datetime1">
               <a:rPr lang="en-US" smtClean="0"/>
-              <a:t>6/10/25</a:t>
+              <a:t>6/11/25</a:t>
             </a:fld>
             <a:endParaRPr lang="en-US"/>
           </a:p>
@@ -1611,7 +1663,7 @@
           <a:p>
             <a:fld id="{AF509990-1782-AB47-8E7B-B9C11C01E289}" type="datetime1">
               <a:rPr lang="en-US" smtClean="0"/>
-              <a:t>6/10/25</a:t>
+              <a:t>6/11/25</a:t>
             </a:fld>
             <a:endParaRPr lang="en-US"/>
           </a:p>
@@ -1898,7 +1950,7 @@
           <a:p>
             <a:fld id="{E142504B-9761-1F49-98C2-56EB9F1DB8AC}" type="datetime1">
               <a:rPr lang="en-US" smtClean="0"/>
-              <a:t>6/10/25</a:t>
+              <a:t>6/11/25</a:t>
             </a:fld>
             <a:endParaRPr lang="en-US"/>
           </a:p>
@@ -2332,7 +2384,7 @@
           <a:p>
             <a:fld id="{05B85524-7523-4744-8A05-CE9A2864AA9E}" type="datetime1">
               <a:rPr lang="en-US" smtClean="0"/>
-              <a:t>6/10/25</a:t>
+              <a:t>6/11/25</a:t>
             </a:fld>
             <a:endParaRPr lang="en-US"/>
           </a:p>
@@ -2495,7 +2547,7 @@
           <a:p>
             <a:fld id="{EAD931E6-063B-1741-B379-3AE99B20A8A2}" type="datetime1">
               <a:rPr lang="en-US" smtClean="0"/>
-              <a:t>6/10/25</a:t>
+              <a:t>6/11/25</a:t>
             </a:fld>
             <a:endParaRPr lang="en-US"/>
           </a:p>
@@ -2630,7 +2682,7 @@
           <a:p>
             <a:fld id="{727E6A8C-BF1A-8243-A251-595AB08426C8}" type="datetime1">
               <a:rPr lang="en-US" smtClean="0"/>
-              <a:t>6/10/25</a:t>
+              <a:t>6/11/25</a:t>
             </a:fld>
             <a:endParaRPr lang="en-US"/>
           </a:p>
@@ -2963,7 +3015,7 @@
           <a:p>
             <a:fld id="{A00C00EA-8704-274D-AB9F-02A0AA44F2B0}" type="datetime1">
               <a:rPr lang="en-US" smtClean="0"/>
-              <a:t>6/10/25</a:t>
+              <a:t>6/11/25</a:t>
             </a:fld>
             <a:endParaRPr lang="en-US"/>
           </a:p>
@@ -3273,7 +3325,7 @@
           <a:p>
             <a:fld id="{570AC09D-A948-CD4B-8D94-F8205E016079}" type="datetime1">
               <a:rPr lang="en-US" smtClean="0"/>
-              <a:t>6/10/25</a:t>
+              <a:t>6/11/25</a:t>
             </a:fld>
             <a:endParaRPr lang="en-US"/>
           </a:p>
@@ -3541,7 +3593,7 @@
           <a:p>
             <a:fld id="{F8D895BB-80C0-3946-B64D-EF32827EB138}" type="datetime1">
               <a:rPr lang="en-US" smtClean="0"/>
-              <a:t>6/10/25</a:t>
+              <a:t>6/11/25</a:t>
             </a:fld>
             <a:endParaRPr lang="en-US" dirty="0"/>
           </a:p>
@@ -4037,6 +4089,31 @@
               <a:t>Josh Clark</a:t>
             </a:r>
           </a:p>
+          <a:p>
+            <a:endParaRPr lang="en-US" dirty="0"/>
+          </a:p>
+          <a:p>
+            <a:r>
+              <a:rPr lang="en-US" dirty="0"/>
+              <a:t>https://</a:t>
+            </a:r>
+            <a:r>
+              <a:rPr lang="en-US" dirty="0" err="1"/>
+              <a:t>github.com</a:t>
+            </a:r>
+            <a:r>
+              <a:rPr lang="en-US" dirty="0"/>
+              <a:t>/je-</a:t>
+            </a:r>
+            <a:r>
+              <a:rPr lang="en-US" dirty="0" err="1"/>
+              <a:t>clark</a:t>
+            </a:r>
+            <a:r>
+              <a:rPr lang="en-US" dirty="0"/>
+              <a:t>/self-25-stratoshark</a:t>
+            </a:r>
+          </a:p>
         </p:txBody>
       </p:sp>
     </p:spTree>
@@ -5053,6 +5130,72 @@
               <a:t>Josh Clark | www.jeclark.net</a:t>
             </a:r>
             <a:endParaRPr lang="en-US" dirty="0"/>
+          </a:p>
+        </p:txBody>
+      </p:sp>
+      <p:sp>
+        <p:nvSpPr>
+          <p:cNvPr id="5" name="TextBox 4">
+            <a:extLst>
+              <a:ext uri="{FF2B5EF4-FFF2-40B4-BE49-F238E27FC236}">
+                <a16:creationId xmlns:a16="http://schemas.microsoft.com/office/drawing/2014/main" id="{B4F0116E-DA4C-CC96-9281-AB3FABAE8965}"/>
+              </a:ext>
+            </a:extLst>
+          </p:cNvPr>
+          <p:cNvSpPr txBox="1"/>
+          <p:nvPr/>
+        </p:nvSpPr>
+        <p:spPr>
+          <a:xfrm>
+            <a:off x="2983609" y="4901609"/>
+            <a:ext cx="6224781" cy="461665"/>
+          </a:xfrm>
+          <a:prstGeom prst="rect">
+            <a:avLst/>
+          </a:prstGeom>
+          <a:noFill/>
+        </p:spPr>
+        <p:txBody>
+          <a:bodyPr wrap="none" rtlCol="0">
+            <a:spAutoFit/>
+          </a:bodyPr>
+          <a:lstStyle/>
+          <a:p>
+            <a:r>
+              <a:rPr lang="en-US" sz="2400" dirty="0">
+                <a:latin typeface="Source Sans Pro" panose="020B0503030403020204" pitchFamily="34" charset="0"/>
+                <a:ea typeface="Source Sans Pro" panose="020B0503030403020204" pitchFamily="34" charset="0"/>
+              </a:rPr>
+              <a:t>https://</a:t>
+            </a:r>
+            <a:r>
+              <a:rPr lang="en-US" sz="2400" dirty="0" err="1">
+                <a:latin typeface="Source Sans Pro" panose="020B0503030403020204" pitchFamily="34" charset="0"/>
+                <a:ea typeface="Source Sans Pro" panose="020B0503030403020204" pitchFamily="34" charset="0"/>
+              </a:rPr>
+              <a:t>github.com</a:t>
+            </a:r>
+            <a:r>
+              <a:rPr lang="en-US" sz="2400" dirty="0">
+                <a:latin typeface="Source Sans Pro" panose="020B0503030403020204" pitchFamily="34" charset="0"/>
+                <a:ea typeface="Source Sans Pro" panose="020B0503030403020204" pitchFamily="34" charset="0"/>
+              </a:rPr>
+              <a:t>/je-</a:t>
+            </a:r>
+            <a:r>
+              <a:rPr lang="en-US" sz="2400" dirty="0" err="1">
+                <a:latin typeface="Source Sans Pro" panose="020B0503030403020204" pitchFamily="34" charset="0"/>
+                <a:ea typeface="Source Sans Pro" panose="020B0503030403020204" pitchFamily="34" charset="0"/>
+              </a:rPr>
+              <a:t>clark</a:t>
+            </a:r>
+            <a:r>
+              <a:rPr lang="en-US" sz="2400" dirty="0">
+                <a:latin typeface="Source Sans Pro" panose="020B0503030403020204" pitchFamily="34" charset="0"/>
+                <a:ea typeface="Source Sans Pro" panose="020B0503030403020204" pitchFamily="34" charset="0"/>
+              </a:rPr>
+              <a:t>/self-25-stratoshark</a:t>
+            </a:r>
           </a:p>
         </p:txBody>
       </p:sp>

</xml_diff>

<commit_message>
I DEFINITELY don't have time for 2 demos. Leaving the capture files for people to peruse on their own, but changing the slides
</commit_message>
<xml_diff>
--- a/introduction_to_stratoshark.pptx
+++ b/introduction_to_stratoshark.pptx
@@ -5,7 +5,7 @@
     <p:sldMasterId id="2147483648" r:id="rId1"/>
   </p:sldMasterIdLst>
   <p:notesMasterIdLst>
-    <p:notesMasterId r:id="rId16"/>
+    <p:notesMasterId r:id="rId15"/>
   </p:notesMasterIdLst>
   <p:sldIdLst>
     <p:sldId id="256" r:id="rId2"/>
@@ -19,9 +19,8 @@
     <p:sldId id="264" r:id="rId10"/>
     <p:sldId id="265" r:id="rId11"/>
     <p:sldId id="266" r:id="rId12"/>
-    <p:sldId id="267" r:id="rId13"/>
-    <p:sldId id="268" r:id="rId14"/>
-    <p:sldId id="269" r:id="rId15"/>
+    <p:sldId id="268" r:id="rId13"/>
+    <p:sldId id="269" r:id="rId14"/>
   </p:sldIdLst>
   <p:sldSz cx="12192000" cy="6858000"/>
   <p:notesSz cx="6858000" cy="9144000"/>
@@ -140,8 +139,8 @@
 <pc:chgInfo xmlns:a="http://schemas.openxmlformats.org/drawingml/2006/main" xmlns:r="http://schemas.openxmlformats.org/officeDocument/2006/relationships" xmlns:ac="http://schemas.microsoft.com/office/drawing/2013/main/command" xmlns:pc="http://schemas.microsoft.com/office/powerpoint/2013/main/command">
   <pc:docChgLst>
     <pc:chgData name="Josh Clark" userId="038a1c1f14b3b0b8" providerId="LiveId" clId="{44EDFAF7-825D-1A43-9502-8E05F1BA453D}"/>
-    <pc:docChg chg="modSld">
-      <pc:chgData name="Josh Clark" userId="038a1c1f14b3b0b8" providerId="LiveId" clId="{44EDFAF7-825D-1A43-9502-8E05F1BA453D}" dt="2025-06-11T22:29:52.365" v="8" actId="1076"/>
+    <pc:docChg chg="delSld modSld">
+      <pc:chgData name="Josh Clark" userId="038a1c1f14b3b0b8" providerId="LiveId" clId="{44EDFAF7-825D-1A43-9502-8E05F1BA453D}" dt="2025-06-13T12:23:43.544" v="11" actId="2696"/>
       <pc:docMkLst>
         <pc:docMk/>
       </pc:docMkLst>
@@ -175,6 +174,28 @@
           </ac:spMkLst>
         </pc:spChg>
       </pc:sldChg>
+      <pc:sldChg chg="modSp mod">
+        <pc:chgData name="Josh Clark" userId="038a1c1f14b3b0b8" providerId="LiveId" clId="{44EDFAF7-825D-1A43-9502-8E05F1BA453D}" dt="2025-06-13T12:23:39.607" v="10" actId="20577"/>
+        <pc:sldMkLst>
+          <pc:docMk/>
+          <pc:sldMk cId="1764323042" sldId="266"/>
+        </pc:sldMkLst>
+        <pc:spChg chg="mod">
+          <ac:chgData name="Josh Clark" userId="038a1c1f14b3b0b8" providerId="LiveId" clId="{44EDFAF7-825D-1A43-9502-8E05F1BA453D}" dt="2025-06-13T12:23:39.607" v="10" actId="20577"/>
+          <ac:spMkLst>
+            <pc:docMk/>
+            <pc:sldMk cId="1764323042" sldId="266"/>
+            <ac:spMk id="2" creationId="{F2B915C2-C3C0-A1F4-BFC6-06040CA378E2}"/>
+          </ac:spMkLst>
+        </pc:spChg>
+      </pc:sldChg>
+      <pc:sldChg chg="del">
+        <pc:chgData name="Josh Clark" userId="038a1c1f14b3b0b8" providerId="LiveId" clId="{44EDFAF7-825D-1A43-9502-8E05F1BA453D}" dt="2025-06-13T12:23:43.544" v="11" actId="2696"/>
+        <pc:sldMkLst>
+          <pc:docMk/>
+          <pc:sldMk cId="2724159607" sldId="267"/>
+        </pc:sldMkLst>
+      </pc:sldChg>
     </pc:docChg>
   </pc:docChgLst>
 </pc:chgInfo>
@@ -262,7 +283,7 @@
           <a:p>
             <a:fld id="{B233D847-AEF7-FF4D-BD54-B99CE00D0E3D}" type="datetimeFigureOut">
               <a:rPr lang="en-US" smtClean="0"/>
-              <a:t>6/11/25</a:t>
+              <a:t>6/13/25</a:t>
             </a:fld>
             <a:endParaRPr lang="en-US"/>
           </a:p>
@@ -688,7 +709,7 @@
           <a:p>
             <a:fld id="{8761A448-C7F2-2847-B192-565C3C193606}" type="datetime1">
               <a:rPr lang="en-US" smtClean="0"/>
-              <a:t>6/11/25</a:t>
+              <a:t>6/13/25</a:t>
             </a:fld>
             <a:endParaRPr lang="en-US"/>
           </a:p>
@@ -908,7 +929,7 @@
           <a:p>
             <a:fld id="{70A94BB3-4C16-A343-9829-EA8D581D2BDF}" type="datetime1">
               <a:rPr lang="en-US" smtClean="0"/>
-              <a:t>6/11/25</a:t>
+              <a:t>6/13/25</a:t>
             </a:fld>
             <a:endParaRPr lang="en-US"/>
           </a:p>
@@ -1138,7 +1159,7 @@
           <a:p>
             <a:fld id="{7A54D3DB-F878-0246-9072-5A89BDA2F6C6}" type="datetime1">
               <a:rPr lang="en-US" smtClean="0"/>
-              <a:t>6/11/25</a:t>
+              <a:t>6/13/25</a:t>
             </a:fld>
             <a:endParaRPr lang="en-US"/>
           </a:p>
@@ -1366,7 +1387,7 @@
           <a:p>
             <a:fld id="{3565266E-2D18-0E4E-A27B-1F32704C3B3B}" type="datetime1">
               <a:rPr lang="en-US" smtClean="0"/>
-              <a:t>6/11/25</a:t>
+              <a:t>6/13/25</a:t>
             </a:fld>
             <a:endParaRPr lang="en-US"/>
           </a:p>
@@ -1663,7 +1684,7 @@
           <a:p>
             <a:fld id="{AF509990-1782-AB47-8E7B-B9C11C01E289}" type="datetime1">
               <a:rPr lang="en-US" smtClean="0"/>
-              <a:t>6/11/25</a:t>
+              <a:t>6/13/25</a:t>
             </a:fld>
             <a:endParaRPr lang="en-US"/>
           </a:p>
@@ -1950,7 +1971,7 @@
           <a:p>
             <a:fld id="{E142504B-9761-1F49-98C2-56EB9F1DB8AC}" type="datetime1">
               <a:rPr lang="en-US" smtClean="0"/>
-              <a:t>6/11/25</a:t>
+              <a:t>6/13/25</a:t>
             </a:fld>
             <a:endParaRPr lang="en-US"/>
           </a:p>
@@ -2384,7 +2405,7 @@
           <a:p>
             <a:fld id="{05B85524-7523-4744-8A05-CE9A2864AA9E}" type="datetime1">
               <a:rPr lang="en-US" smtClean="0"/>
-              <a:t>6/11/25</a:t>
+              <a:t>6/13/25</a:t>
             </a:fld>
             <a:endParaRPr lang="en-US"/>
           </a:p>
@@ -2547,7 +2568,7 @@
           <a:p>
             <a:fld id="{EAD931E6-063B-1741-B379-3AE99B20A8A2}" type="datetime1">
               <a:rPr lang="en-US" smtClean="0"/>
-              <a:t>6/11/25</a:t>
+              <a:t>6/13/25</a:t>
             </a:fld>
             <a:endParaRPr lang="en-US"/>
           </a:p>
@@ -2682,7 +2703,7 @@
           <a:p>
             <a:fld id="{727E6A8C-BF1A-8243-A251-595AB08426C8}" type="datetime1">
               <a:rPr lang="en-US" smtClean="0"/>
-              <a:t>6/11/25</a:t>
+              <a:t>6/13/25</a:t>
             </a:fld>
             <a:endParaRPr lang="en-US"/>
           </a:p>
@@ -3015,7 +3036,7 @@
           <a:p>
             <a:fld id="{A00C00EA-8704-274D-AB9F-02A0AA44F2B0}" type="datetime1">
               <a:rPr lang="en-US" smtClean="0"/>
-              <a:t>6/11/25</a:t>
+              <a:t>6/13/25</a:t>
             </a:fld>
             <a:endParaRPr lang="en-US"/>
           </a:p>
@@ -3325,7 +3346,7 @@
           <a:p>
             <a:fld id="{570AC09D-A948-CD4B-8D94-F8205E016079}" type="datetime1">
               <a:rPr lang="en-US" smtClean="0"/>
-              <a:t>6/11/25</a:t>
+              <a:t>6/13/25</a:t>
             </a:fld>
             <a:endParaRPr lang="en-US"/>
           </a:p>
@@ -3593,7 +3614,7 @@
           <a:p>
             <a:fld id="{F8D895BB-80C0-3946-B64D-EF32827EB138}" type="datetime1">
               <a:rPr lang="en-US" smtClean="0"/>
-              <a:t>6/11/25</a:t>
+              <a:t>6/13/25</a:t>
             </a:fld>
             <a:endParaRPr lang="en-US" dirty="0"/>
           </a:p>
@@ -4450,7 +4471,7 @@
           <a:p>
             <a:r>
               <a:rPr lang="en-US" dirty="0"/>
-              <a:t>Demo 1: HTTP</a:t>
+              <a:t>Demo: HTTP</a:t>
             </a:r>
           </a:p>
         </p:txBody>
@@ -4534,138 +4555,6 @@
 </file>
 
 <file path=ppt/slides/slide12.xml><?xml version="1.0" encoding="utf-8"?>
-<p:sld xmlns:a="http://schemas.openxmlformats.org/drawingml/2006/main" xmlns:r="http://schemas.openxmlformats.org/officeDocument/2006/relationships" xmlns:p="http://schemas.openxmlformats.org/presentationml/2006/main">
-  <p:cSld>
-    <p:spTree>
-      <p:nvGrpSpPr>
-        <p:cNvPr id="1" name="">
-          <a:extLst>
-            <a:ext uri="{FF2B5EF4-FFF2-40B4-BE49-F238E27FC236}">
-              <a16:creationId xmlns:a16="http://schemas.microsoft.com/office/drawing/2014/main" id="{8B41C214-18AB-B366-F214-D77BE1425016}"/>
-            </a:ext>
-          </a:extLst>
-        </p:cNvPr>
-        <p:cNvGrpSpPr/>
-        <p:nvPr/>
-      </p:nvGrpSpPr>
-      <p:grpSpPr>
-        <a:xfrm>
-          <a:off x="0" y="0"/>
-          <a:ext cx="0" cy="0"/>
-          <a:chOff x="0" y="0"/>
-          <a:chExt cx="0" cy="0"/>
-        </a:xfrm>
-      </p:grpSpPr>
-      <p:sp>
-        <p:nvSpPr>
-          <p:cNvPr id="2" name="Title 1">
-            <a:extLst>
-              <a:ext uri="{FF2B5EF4-FFF2-40B4-BE49-F238E27FC236}">
-                <a16:creationId xmlns:a16="http://schemas.microsoft.com/office/drawing/2014/main" id="{4BCEE92C-2ADE-E479-8F72-E21FE92AEBC8}"/>
-              </a:ext>
-            </a:extLst>
-          </p:cNvPr>
-          <p:cNvSpPr>
-            <a:spLocks noGrp="1"/>
-          </p:cNvSpPr>
-          <p:nvPr>
-            <p:ph type="title"/>
-          </p:nvPr>
-        </p:nvSpPr>
-        <p:spPr/>
-        <p:txBody>
-          <a:bodyPr/>
-          <a:lstStyle/>
-          <a:p>
-            <a:r>
-              <a:rPr lang="en-US" dirty="0"/>
-              <a:t>Demo 2: SCP File Transfer</a:t>
-            </a:r>
-          </a:p>
-        </p:txBody>
-      </p:sp>
-      <p:sp>
-        <p:nvSpPr>
-          <p:cNvPr id="3" name="Content Placeholder 2">
-            <a:extLst>
-              <a:ext uri="{FF2B5EF4-FFF2-40B4-BE49-F238E27FC236}">
-                <a16:creationId xmlns:a16="http://schemas.microsoft.com/office/drawing/2014/main" id="{689476C8-7E6E-A77B-AE0B-3E509A6BBC3B}"/>
-              </a:ext>
-            </a:extLst>
-          </p:cNvPr>
-          <p:cNvSpPr>
-            <a:spLocks noGrp="1"/>
-          </p:cNvSpPr>
-          <p:nvPr>
-            <p:ph idx="1"/>
-          </p:nvPr>
-        </p:nvSpPr>
-        <p:spPr/>
-        <p:txBody>
-          <a:bodyPr/>
-          <a:lstStyle/>
-          <a:p>
-            <a:r>
-              <a:rPr lang="en-US" dirty="0" err="1"/>
-              <a:t>scp_packets.pcapng</a:t>
-            </a:r>
-            <a:endParaRPr lang="en-US" dirty="0"/>
-          </a:p>
-          <a:p>
-            <a:r>
-              <a:rPr lang="en-US" dirty="0" err="1"/>
-              <a:t>scp_syscalls.scap</a:t>
-            </a:r>
-            <a:endParaRPr lang="en-US" dirty="0"/>
-          </a:p>
-          <a:p>
-            <a:endParaRPr lang="en-US" dirty="0"/>
-          </a:p>
-        </p:txBody>
-      </p:sp>
-      <p:sp>
-        <p:nvSpPr>
-          <p:cNvPr id="4" name="Footer Placeholder 3">
-            <a:extLst>
-              <a:ext uri="{FF2B5EF4-FFF2-40B4-BE49-F238E27FC236}">
-                <a16:creationId xmlns:a16="http://schemas.microsoft.com/office/drawing/2014/main" id="{7962872A-AABB-1266-5446-C20C6835844B}"/>
-              </a:ext>
-            </a:extLst>
-          </p:cNvPr>
-          <p:cNvSpPr>
-            <a:spLocks noGrp="1"/>
-          </p:cNvSpPr>
-          <p:nvPr>
-            <p:ph type="ftr" sz="quarter" idx="3"/>
-          </p:nvPr>
-        </p:nvSpPr>
-        <p:spPr/>
-        <p:txBody>
-          <a:bodyPr/>
-          <a:lstStyle/>
-          <a:p>
-            <a:r>
-              <a:rPr lang="en-US"/>
-              <a:t>Josh Clark | www.jeclark.net</a:t>
-            </a:r>
-            <a:endParaRPr lang="en-US" dirty="0"/>
-          </a:p>
-        </p:txBody>
-      </p:sp>
-    </p:spTree>
-    <p:extLst>
-      <p:ext uri="{BB962C8B-B14F-4D97-AF65-F5344CB8AC3E}">
-        <p14:creationId xmlns:p14="http://schemas.microsoft.com/office/powerpoint/2010/main" val="2724159607"/>
-      </p:ext>
-    </p:extLst>
-  </p:cSld>
-  <p:clrMapOvr>
-    <a:masterClrMapping/>
-  </p:clrMapOvr>
-</p:sld>
-</file>
-
-<file path=ppt/slides/slide13.xml><?xml version="1.0" encoding="utf-8"?>
 <p:sld xmlns:a="http://schemas.openxmlformats.org/drawingml/2006/main" xmlns:r="http://schemas.openxmlformats.org/officeDocument/2006/relationships" xmlns:p="http://schemas.openxmlformats.org/presentationml/2006/main">
   <p:cSld>
     <p:spTree>
@@ -4866,7 +4755,7 @@
 </p:sld>
 </file>
 
-<file path=ppt/slides/slide14.xml><?xml version="1.0" encoding="utf-8"?>
+<file path=ppt/slides/slide13.xml><?xml version="1.0" encoding="utf-8"?>
 <p:sld xmlns:a="http://schemas.openxmlformats.org/drawingml/2006/main" xmlns:r="http://schemas.openxmlformats.org/officeDocument/2006/relationships" xmlns:p="http://schemas.openxmlformats.org/presentationml/2006/main">
   <p:cSld>
     <p:spTree>

</xml_diff>